<commit_message>
Removed empty frames from the presentation.
</commit_message>
<xml_diff>
--- a/not-to-release/Alksnis slides.pptx
+++ b/not-to-release/Alksnis slides.pptx
@@ -7276,44 +7276,6 @@
           </a:p>
         </p:txBody>
       </p:sp>
-      <p:sp>
-        <p:nvSpPr>
-          <p:cNvPr id="138" name="Google Shape;138;p22"/>
-          <p:cNvSpPr txBox="1">
-            <a:spLocks noGrp="1"/>
-          </p:cNvSpPr>
-          <p:nvPr>
-            <p:ph type="body" idx="1"/>
-          </p:nvPr>
-        </p:nvSpPr>
-        <p:spPr>
-          <a:xfrm>
-            <a:off x="311700" y="1152475"/>
-            <a:ext cx="8520600" cy="3416400"/>
-          </a:xfrm>
-          <a:prstGeom prst="rect">
-            <a:avLst/>
-          </a:prstGeom>
-        </p:spPr>
-        <p:txBody>
-          <a:bodyPr spcFirstLastPara="1" wrap="square" lIns="91425" tIns="91425" rIns="91425" bIns="91425" anchor="t" anchorCtr="0">
-            <a:noAutofit/>
-          </a:bodyPr>
-          <a:lstStyle/>
-          <a:p>
-            <a:pPr marL="0" lvl="0" indent="0" algn="l" rtl="0">
-              <a:spcBef>
-                <a:spcPts val="0"/>
-              </a:spcBef>
-              <a:spcAft>
-                <a:spcPts val="1600"/>
-              </a:spcAft>
-              <a:buNone/>
-            </a:pPr>
-            <a:endParaRPr/>
-          </a:p>
-        </p:txBody>
-      </p:sp>
     </p:spTree>
   </p:cSld>
   <p:clrMapOvr>
@@ -7377,44 +7339,6 @@
               <a:rPr lang="en"/>
               <a:t>“to be” + Gen.</a:t>
             </a:r>
-            <a:endParaRPr/>
-          </a:p>
-        </p:txBody>
-      </p:sp>
-      <p:sp>
-        <p:nvSpPr>
-          <p:cNvPr id="144" name="Google Shape;144;p23"/>
-          <p:cNvSpPr txBox="1">
-            <a:spLocks noGrp="1"/>
-          </p:cNvSpPr>
-          <p:nvPr>
-            <p:ph type="body" idx="1"/>
-          </p:nvPr>
-        </p:nvSpPr>
-        <p:spPr>
-          <a:xfrm>
-            <a:off x="311700" y="1152475"/>
-            <a:ext cx="8520600" cy="3416400"/>
-          </a:xfrm>
-          <a:prstGeom prst="rect">
-            <a:avLst/>
-          </a:prstGeom>
-        </p:spPr>
-        <p:txBody>
-          <a:bodyPr spcFirstLastPara="1" wrap="square" lIns="91425" tIns="91425" rIns="91425" bIns="91425" anchor="t" anchorCtr="0">
-            <a:noAutofit/>
-          </a:bodyPr>
-          <a:lstStyle/>
-          <a:p>
-            <a:pPr marL="0" lvl="0" indent="0" algn="l" rtl="0">
-              <a:spcBef>
-                <a:spcPts val="0"/>
-              </a:spcBef>
-              <a:spcAft>
-                <a:spcPts val="1600"/>
-              </a:spcAft>
-              <a:buNone/>
-            </a:pPr>
             <a:endParaRPr/>
           </a:p>
         </p:txBody>
@@ -7556,44 +7480,6 @@
           </a:p>
         </p:txBody>
       </p:sp>
-      <p:sp>
-        <p:nvSpPr>
-          <p:cNvPr id="152" name="Google Shape;152;p24"/>
-          <p:cNvSpPr txBox="1">
-            <a:spLocks noGrp="1"/>
-          </p:cNvSpPr>
-          <p:nvPr>
-            <p:ph type="body" idx="1"/>
-          </p:nvPr>
-        </p:nvSpPr>
-        <p:spPr>
-          <a:xfrm>
-            <a:off x="311700" y="1152475"/>
-            <a:ext cx="8520600" cy="3416400"/>
-          </a:xfrm>
-          <a:prstGeom prst="rect">
-            <a:avLst/>
-          </a:prstGeom>
-        </p:spPr>
-        <p:txBody>
-          <a:bodyPr spcFirstLastPara="1" wrap="square" lIns="91425" tIns="91425" rIns="91425" bIns="91425" anchor="t" anchorCtr="0">
-            <a:noAutofit/>
-          </a:bodyPr>
-          <a:lstStyle/>
-          <a:p>
-            <a:pPr marL="0" lvl="0" indent="0" algn="l" rtl="0">
-              <a:spcBef>
-                <a:spcPts val="0"/>
-              </a:spcBef>
-              <a:spcAft>
-                <a:spcPts val="1600"/>
-              </a:spcAft>
-              <a:buNone/>
-            </a:pPr>
-            <a:endParaRPr/>
-          </a:p>
-        </p:txBody>
-      </p:sp>
       <p:pic>
         <p:nvPicPr>
           <p:cNvPr id="153" name="Google Shape;153;p24"/>
@@ -7727,44 +7613,6 @@
               <a:rPr lang="en"/>
               <a:t>more/less/several + Gen.</a:t>
             </a:r>
-            <a:endParaRPr/>
-          </a:p>
-        </p:txBody>
-      </p:sp>
-      <p:sp>
-        <p:nvSpPr>
-          <p:cNvPr id="160" name="Google Shape;160;p25"/>
-          <p:cNvSpPr txBox="1">
-            <a:spLocks noGrp="1"/>
-          </p:cNvSpPr>
-          <p:nvPr>
-            <p:ph type="body" idx="1"/>
-          </p:nvPr>
-        </p:nvSpPr>
-        <p:spPr>
-          <a:xfrm>
-            <a:off x="311700" y="1152475"/>
-            <a:ext cx="8520600" cy="3416400"/>
-          </a:xfrm>
-          <a:prstGeom prst="rect">
-            <a:avLst/>
-          </a:prstGeom>
-        </p:spPr>
-        <p:txBody>
-          <a:bodyPr spcFirstLastPara="1" wrap="square" lIns="91425" tIns="91425" rIns="91425" bIns="91425" anchor="t" anchorCtr="0">
-            <a:noAutofit/>
-          </a:bodyPr>
-          <a:lstStyle/>
-          <a:p>
-            <a:pPr marL="0" lvl="0" indent="0" algn="l" rtl="0">
-              <a:spcBef>
-                <a:spcPts val="0"/>
-              </a:spcBef>
-              <a:spcAft>
-                <a:spcPts val="1600"/>
-              </a:spcAft>
-              <a:buNone/>
-            </a:pPr>
             <a:endParaRPr/>
           </a:p>
         </p:txBody>
@@ -8470,44 +8318,6 @@
           </a:p>
         </p:txBody>
       </p:sp>
-      <p:sp>
-        <p:nvSpPr>
-          <p:cNvPr id="188" name="Google Shape;188;p28"/>
-          <p:cNvSpPr txBox="1">
-            <a:spLocks noGrp="1"/>
-          </p:cNvSpPr>
-          <p:nvPr>
-            <p:ph type="body" idx="1"/>
-          </p:nvPr>
-        </p:nvSpPr>
-        <p:spPr>
-          <a:xfrm>
-            <a:off x="311700" y="1152475"/>
-            <a:ext cx="8520600" cy="3416400"/>
-          </a:xfrm>
-          <a:prstGeom prst="rect">
-            <a:avLst/>
-          </a:prstGeom>
-        </p:spPr>
-        <p:txBody>
-          <a:bodyPr spcFirstLastPara="1" wrap="square" lIns="91425" tIns="91425" rIns="91425" bIns="91425" anchor="t" anchorCtr="0">
-            <a:noAutofit/>
-          </a:bodyPr>
-          <a:lstStyle/>
-          <a:p>
-            <a:pPr marL="0" lvl="0" indent="0" algn="l" rtl="0">
-              <a:spcBef>
-                <a:spcPts val="0"/>
-              </a:spcBef>
-              <a:spcAft>
-                <a:spcPts val="1600"/>
-              </a:spcAft>
-              <a:buNone/>
-            </a:pPr>
-            <a:endParaRPr/>
-          </a:p>
-        </p:txBody>
-      </p:sp>
       <p:pic>
         <p:nvPicPr>
           <p:cNvPr id="189" name="Google Shape;189;p28"/>
@@ -9754,44 +9564,6 @@
       </p:sp>
       <p:sp>
         <p:nvSpPr>
-          <p:cNvPr id="106" name="Google Shape;106;p18"/>
-          <p:cNvSpPr txBox="1">
-            <a:spLocks noGrp="1"/>
-          </p:cNvSpPr>
-          <p:nvPr>
-            <p:ph type="body" idx="1"/>
-          </p:nvPr>
-        </p:nvSpPr>
-        <p:spPr>
-          <a:xfrm>
-            <a:off x="311700" y="1152475"/>
-            <a:ext cx="8520600" cy="3416400"/>
-          </a:xfrm>
-          <a:prstGeom prst="rect">
-            <a:avLst/>
-          </a:prstGeom>
-        </p:spPr>
-        <p:txBody>
-          <a:bodyPr spcFirstLastPara="1" wrap="square" lIns="91425" tIns="91425" rIns="91425" bIns="91425" anchor="t" anchorCtr="0">
-            <a:noAutofit/>
-          </a:bodyPr>
-          <a:lstStyle/>
-          <a:p>
-            <a:pPr marL="0" lvl="0" indent="0" algn="l" rtl="0">
-              <a:spcBef>
-                <a:spcPts val="0"/>
-              </a:spcBef>
-              <a:spcAft>
-                <a:spcPts val="1600"/>
-              </a:spcAft>
-              <a:buNone/>
-            </a:pPr>
-            <a:endParaRPr/>
-          </a:p>
-        </p:txBody>
-      </p:sp>
-      <p:sp>
-        <p:nvSpPr>
           <p:cNvPr id="107" name="Google Shape;107;p18"/>
           <p:cNvSpPr txBox="1"/>
           <p:nvPr/>
@@ -9955,44 +9727,6 @@
           </a:p>
         </p:txBody>
       </p:sp>
-      <p:sp>
-        <p:nvSpPr>
-          <p:cNvPr id="115" name="Google Shape;115;p19"/>
-          <p:cNvSpPr txBox="1">
-            <a:spLocks noGrp="1"/>
-          </p:cNvSpPr>
-          <p:nvPr>
-            <p:ph type="body" idx="1"/>
-          </p:nvPr>
-        </p:nvSpPr>
-        <p:spPr>
-          <a:xfrm>
-            <a:off x="311700" y="1152475"/>
-            <a:ext cx="8520600" cy="3416400"/>
-          </a:xfrm>
-          <a:prstGeom prst="rect">
-            <a:avLst/>
-          </a:prstGeom>
-        </p:spPr>
-        <p:txBody>
-          <a:bodyPr spcFirstLastPara="1" wrap="square" lIns="91425" tIns="91425" rIns="91425" bIns="91425" anchor="t" anchorCtr="0">
-            <a:noAutofit/>
-          </a:bodyPr>
-          <a:lstStyle/>
-          <a:p>
-            <a:pPr marL="0" lvl="0" indent="0" algn="l" rtl="0">
-              <a:spcBef>
-                <a:spcPts val="0"/>
-              </a:spcBef>
-              <a:spcAft>
-                <a:spcPts val="1600"/>
-              </a:spcAft>
-              <a:buNone/>
-            </a:pPr>
-            <a:endParaRPr/>
-          </a:p>
-        </p:txBody>
-      </p:sp>
       <p:pic>
         <p:nvPicPr>
           <p:cNvPr id="116" name="Google Shape;116;p19"/>
@@ -10084,44 +9818,6 @@
               <a:rPr lang="en"/>
               <a:t>Nested coordination</a:t>
             </a:r>
-            <a:endParaRPr/>
-          </a:p>
-        </p:txBody>
-      </p:sp>
-      <p:sp>
-        <p:nvSpPr>
-          <p:cNvPr id="122" name="Google Shape;122;p20"/>
-          <p:cNvSpPr txBox="1">
-            <a:spLocks noGrp="1"/>
-          </p:cNvSpPr>
-          <p:nvPr>
-            <p:ph type="body" idx="1"/>
-          </p:nvPr>
-        </p:nvSpPr>
-        <p:spPr>
-          <a:xfrm>
-            <a:off x="311700" y="1152475"/>
-            <a:ext cx="8520600" cy="3416400"/>
-          </a:xfrm>
-          <a:prstGeom prst="rect">
-            <a:avLst/>
-          </a:prstGeom>
-        </p:spPr>
-        <p:txBody>
-          <a:bodyPr spcFirstLastPara="1" wrap="square" lIns="91425" tIns="91425" rIns="91425" bIns="91425" anchor="t" anchorCtr="0">
-            <a:noAutofit/>
-          </a:bodyPr>
-          <a:lstStyle/>
-          <a:p>
-            <a:pPr marL="0" lvl="0" indent="0" algn="l" rtl="0">
-              <a:spcBef>
-                <a:spcPts val="0"/>
-              </a:spcBef>
-              <a:spcAft>
-                <a:spcPts val="1600"/>
-              </a:spcAft>
-              <a:buNone/>
-            </a:pPr>
             <a:endParaRPr/>
           </a:p>
         </p:txBody>
@@ -10259,44 +9955,6 @@
               <a:rPr lang="en"/>
               <a:t>Instrumentalis as iobj?</a:t>
             </a:r>
-            <a:endParaRPr/>
-          </a:p>
-        </p:txBody>
-      </p:sp>
-      <p:sp>
-        <p:nvSpPr>
-          <p:cNvPr id="130" name="Google Shape;130;p21"/>
-          <p:cNvSpPr txBox="1">
-            <a:spLocks noGrp="1"/>
-          </p:cNvSpPr>
-          <p:nvPr>
-            <p:ph type="body" idx="1"/>
-          </p:nvPr>
-        </p:nvSpPr>
-        <p:spPr>
-          <a:xfrm>
-            <a:off x="311700" y="1152475"/>
-            <a:ext cx="8520600" cy="3416400"/>
-          </a:xfrm>
-          <a:prstGeom prst="rect">
-            <a:avLst/>
-          </a:prstGeom>
-        </p:spPr>
-        <p:txBody>
-          <a:bodyPr spcFirstLastPara="1" wrap="square" lIns="91425" tIns="91425" rIns="91425" bIns="91425" anchor="t" anchorCtr="0">
-            <a:noAutofit/>
-          </a:bodyPr>
-          <a:lstStyle/>
-          <a:p>
-            <a:pPr marL="0" lvl="0" indent="0" algn="l" rtl="0">
-              <a:spcBef>
-                <a:spcPts val="0"/>
-              </a:spcBef>
-              <a:spcAft>
-                <a:spcPts val="1600"/>
-              </a:spcAft>
-              <a:buNone/>
-            </a:pPr>
             <a:endParaRPr/>
           </a:p>
         </p:txBody>

</xml_diff>